<commit_message>
This is an updated version of the document
</commit_message>
<xml_diff>
--- a/WeeklyMeeting3.pptx
+++ b/WeeklyMeeting3.pptx
@@ -5,11 +5,12 @@
     <p:sldMasterId id="2147483660" r:id="rId1"/>
   </p:sldMasterIdLst>
   <p:sldIdLst>
-    <p:sldId id="256" r:id="rId2"/>
-    <p:sldId id="257" r:id="rId3"/>
-    <p:sldId id="258" r:id="rId4"/>
-    <p:sldId id="259" r:id="rId5"/>
-    <p:sldId id="260" r:id="rId6"/>
+    <p:sldId id="257" r:id="rId2"/>
+    <p:sldId id="258" r:id="rId3"/>
+    <p:sldId id="259" r:id="rId4"/>
+    <p:sldId id="260" r:id="rId5"/>
+    <p:sldId id="261" r:id="rId6"/>
+    <p:sldId id="262" r:id="rId7"/>
   </p:sldIdLst>
   <p:sldSz cx="9144000" cy="6858000" type="screen4x3"/>
   <p:notesSz cx="7010400" cy="9296400"/>
@@ -4366,93 +4367,6 @@
           <a:bodyPr/>
           <a:lstStyle/>
           <a:p>
-            <a:endParaRPr lang="en-US"/>
-          </a:p>
-        </p:txBody>
-      </p:sp>
-      <p:sp>
-        <p:nvSpPr>
-          <p:cNvPr id="3" name="Subtitle 2"/>
-          <p:cNvSpPr>
-            <a:spLocks noGrp="1"/>
-          </p:cNvSpPr>
-          <p:nvPr>
-            <p:ph type="subTitle" idx="1"/>
-          </p:nvPr>
-        </p:nvSpPr>
-        <p:spPr/>
-        <p:txBody>
-          <a:bodyPr/>
-          <a:lstStyle/>
-          <a:p>
-            <a:endParaRPr lang="en-US"/>
-          </a:p>
-        </p:txBody>
-      </p:sp>
-      <p:sp>
-        <p:nvSpPr>
-          <p:cNvPr id="4" name="Text Placeholder 3"/>
-          <p:cNvSpPr>
-            <a:spLocks noGrp="1"/>
-          </p:cNvSpPr>
-          <p:nvPr>
-            <p:ph type="body" sz="quarter" idx="10"/>
-          </p:nvPr>
-        </p:nvSpPr>
-        <p:spPr/>
-        <p:txBody>
-          <a:bodyPr/>
-          <a:lstStyle/>
-          <a:p>
-            <a:endParaRPr lang="en-US"/>
-          </a:p>
-        </p:txBody>
-      </p:sp>
-    </p:spTree>
-    <p:extLst>
-      <p:ext uri="{BB962C8B-B14F-4D97-AF65-F5344CB8AC3E}">
-        <p14:creationId xmlns:p14="http://schemas.microsoft.com/office/powerpoint/2010/main" val="4042172785"/>
-      </p:ext>
-    </p:extLst>
-  </p:cSld>
-  <p:clrMapOvr>
-    <a:masterClrMapping/>
-  </p:clrMapOvr>
-</p:sld>
-</file>
-
-<file path=ppt/slides/slide2.xml><?xml version="1.0" encoding="utf-8"?>
-<p:sld xmlns:a="http://schemas.openxmlformats.org/drawingml/2006/main" xmlns:r="http://schemas.openxmlformats.org/officeDocument/2006/relationships" xmlns:p="http://schemas.openxmlformats.org/presentationml/2006/main">
-  <p:cSld>
-    <p:spTree>
-      <p:nvGrpSpPr>
-        <p:cNvPr id="1" name=""/>
-        <p:cNvGrpSpPr/>
-        <p:nvPr/>
-      </p:nvGrpSpPr>
-      <p:grpSpPr>
-        <a:xfrm>
-          <a:off x="0" y="0"/>
-          <a:ext cx="0" cy="0"/>
-          <a:chOff x="0" y="0"/>
-          <a:chExt cx="0" cy="0"/>
-        </a:xfrm>
-      </p:grpSpPr>
-      <p:sp>
-        <p:nvSpPr>
-          <p:cNvPr id="2" name="Title 1"/>
-          <p:cNvSpPr>
-            <a:spLocks noGrp="1"/>
-          </p:cNvSpPr>
-          <p:nvPr>
-            <p:ph type="ctrTitle"/>
-          </p:nvPr>
-        </p:nvSpPr>
-        <p:spPr/>
-        <p:txBody>
-          <a:bodyPr/>
-          <a:lstStyle/>
-          <a:p>
             <a:r>
               <a:rPr lang="en-US" dirty="0"/>
               <a:t>Bi-Weekly Meetings #2</a:t>
@@ -4517,7 +4431,7 @@
 </p:sld>
 </file>
 
-<file path=ppt/slides/slide3.xml><?xml version="1.0" encoding="utf-8"?>
+<file path=ppt/slides/slide2.xml><?xml version="1.0" encoding="utf-8"?>
 <p:sld xmlns:a="http://schemas.openxmlformats.org/drawingml/2006/main" xmlns:r="http://schemas.openxmlformats.org/officeDocument/2006/relationships" xmlns:p="http://schemas.openxmlformats.org/presentationml/2006/main">
   <p:cSld>
     <p:spTree>
@@ -5602,7 +5516,7 @@
             <a:fld id="{B347FA65-0AFF-D745-B01A-93117137B35D}" type="slidenum">
               <a:rPr lang="en-US" smtClean="0"/>
               <a:pPr/>
-              <a:t>3</a:t>
+              <a:t>2</a:t>
             </a:fld>
             <a:endParaRPr lang="en-US" dirty="0"/>
           </a:p>
@@ -5641,6 +5555,124 @@
     <p:extLst>
       <p:ext uri="{BB962C8B-B14F-4D97-AF65-F5344CB8AC3E}">
         <p14:creationId xmlns:p14="http://schemas.microsoft.com/office/powerpoint/2010/main" val="2830774762"/>
+      </p:ext>
+    </p:extLst>
+  </p:cSld>
+  <p:clrMapOvr>
+    <a:masterClrMapping/>
+  </p:clrMapOvr>
+</p:sld>
+</file>
+
+<file path=ppt/slides/slide3.xml><?xml version="1.0" encoding="utf-8"?>
+<p:sld xmlns:a="http://schemas.openxmlformats.org/drawingml/2006/main" xmlns:r="http://schemas.openxmlformats.org/officeDocument/2006/relationships" xmlns:p="http://schemas.openxmlformats.org/presentationml/2006/main">
+  <p:cSld>
+    <p:spTree>
+      <p:nvGrpSpPr>
+        <p:cNvPr id="1" name=""/>
+        <p:cNvGrpSpPr/>
+        <p:nvPr/>
+      </p:nvGrpSpPr>
+      <p:grpSpPr>
+        <a:xfrm>
+          <a:off x="0" y="0"/>
+          <a:ext cx="0" cy="0"/>
+          <a:chOff x="0" y="0"/>
+          <a:chExt cx="0" cy="0"/>
+        </a:xfrm>
+      </p:grpSpPr>
+      <p:sp>
+        <p:nvSpPr>
+          <p:cNvPr id="2" name="Título 1">
+            <a:extLst>
+              <a:ext uri="{FF2B5EF4-FFF2-40B4-BE49-F238E27FC236}">
+                <a16:creationId xmlns:a16="http://schemas.microsoft.com/office/drawing/2014/main" id="{C64132B0-DA98-43DE-8084-0D3EA2A07A78}"/>
+              </a:ext>
+            </a:extLst>
+          </p:cNvPr>
+          <p:cNvSpPr>
+            <a:spLocks noGrp="1"/>
+          </p:cNvSpPr>
+          <p:nvPr>
+            <p:ph type="title"/>
+          </p:nvPr>
+        </p:nvSpPr>
+        <p:spPr/>
+        <p:txBody>
+          <a:bodyPr/>
+          <a:lstStyle/>
+          <a:p>
+            <a:r>
+              <a:rPr lang="en-US" dirty="0" smtClean="0"/>
+              <a:t>Version Control with </a:t>
+            </a:r>
+            <a:r>
+              <a:rPr lang="en-US" dirty="0" err="1" smtClean="0"/>
+              <a:t>Github</a:t>
+            </a:r>
+            <a:endParaRPr lang="en-US" dirty="0"/>
+          </a:p>
+        </p:txBody>
+      </p:sp>
+      <p:sp>
+        <p:nvSpPr>
+          <p:cNvPr id="3" name="Marcador de texto 2">
+            <a:extLst>
+              <a:ext uri="{FF2B5EF4-FFF2-40B4-BE49-F238E27FC236}">
+                <a16:creationId xmlns:a16="http://schemas.microsoft.com/office/drawing/2014/main" id="{FEE8E4AF-9A49-46F5-A27F-D92F5CE199AA}"/>
+              </a:ext>
+            </a:extLst>
+          </p:cNvPr>
+          <p:cNvSpPr>
+            <a:spLocks noGrp="1"/>
+          </p:cNvSpPr>
+          <p:nvPr>
+            <p:ph type="body" idx="1"/>
+          </p:nvPr>
+        </p:nvSpPr>
+        <p:spPr/>
+        <p:txBody>
+          <a:bodyPr/>
+          <a:lstStyle/>
+          <a:p>
+            <a:endParaRPr lang="en-US" dirty="0"/>
+          </a:p>
+        </p:txBody>
+      </p:sp>
+      <p:sp>
+        <p:nvSpPr>
+          <p:cNvPr id="4" name="Marcador de número de diapositiva 3">
+            <a:extLst>
+              <a:ext uri="{FF2B5EF4-FFF2-40B4-BE49-F238E27FC236}">
+                <a16:creationId xmlns:a16="http://schemas.microsoft.com/office/drawing/2014/main" id="{8369396B-6E13-4FED-A6F2-DA8723B8CDEC}"/>
+              </a:ext>
+            </a:extLst>
+          </p:cNvPr>
+          <p:cNvSpPr>
+            <a:spLocks noGrp="1"/>
+          </p:cNvSpPr>
+          <p:nvPr>
+            <p:ph type="sldNum" sz="quarter" idx="11"/>
+          </p:nvPr>
+        </p:nvSpPr>
+        <p:spPr/>
+        <p:txBody>
+          <a:bodyPr/>
+          <a:lstStyle/>
+          <a:p>
+            <a:fld id="{B347FA65-0AFF-D745-B01A-93117137B35D}" type="slidenum">
+              <a:rPr lang="en-US" smtClean="0"/>
+              <a:pPr/>
+              <a:t>3</a:t>
+            </a:fld>
+            <a:endParaRPr lang="en-US" dirty="0"/>
+          </a:p>
+        </p:txBody>
+      </p:sp>
+    </p:spTree>
+    <p:extLst>
+      <p:ext uri="{BB962C8B-B14F-4D97-AF65-F5344CB8AC3E}">
+        <p14:creationId xmlns:p14="http://schemas.microsoft.com/office/powerpoint/2010/main" val="6631764"/>
       </p:ext>
     </p:extLst>
   </p:cSld>
@@ -5694,7 +5726,7 @@
             </a:r>
             <a:r>
               <a:rPr lang="en-US" dirty="0" err="1" smtClean="0"/>
-              <a:t>Github</a:t>
+              <a:t>Git</a:t>
             </a:r>
             <a:endParaRPr lang="en-US" dirty="0"/>
           </a:p>
@@ -5702,18 +5734,12 @@
       </p:sp>
       <p:sp>
         <p:nvSpPr>
-          <p:cNvPr id="3" name="Marcador de texto 2">
-            <a:extLst>
-              <a:ext uri="{FF2B5EF4-FFF2-40B4-BE49-F238E27FC236}">
-                <a16:creationId xmlns:a16="http://schemas.microsoft.com/office/drawing/2014/main" id="{FEE8E4AF-9A49-46F5-A27F-D92F5CE199AA}"/>
-              </a:ext>
-            </a:extLst>
-          </p:cNvPr>
+          <p:cNvPr id="5" name="Content Placeholder 4"/>
           <p:cNvSpPr>
             <a:spLocks noGrp="1"/>
           </p:cNvSpPr>
           <p:nvPr>
-            <p:ph type="body" idx="1"/>
+            <p:ph idx="1"/>
           </p:nvPr>
         </p:nvSpPr>
         <p:spPr/>
@@ -5721,6 +5747,37 @@
           <a:bodyPr/>
           <a:lstStyle/>
           <a:p>
+            <a:r>
+              <a:rPr lang="en-US" dirty="0" err="1" smtClean="0"/>
+              <a:t>Github</a:t>
+            </a:r>
+            <a:r>
+              <a:rPr lang="en-US" dirty="0" smtClean="0"/>
+              <a:t> is an online platform which can be used for efficient version control of documents. </a:t>
+            </a:r>
+          </a:p>
+          <a:p>
+            <a:r>
+              <a:rPr lang="en-US" dirty="0" smtClean="0"/>
+              <a:t>Each file on the GitHub repository will have a history, so changes can be tracked in different versions. </a:t>
+            </a:r>
+          </a:p>
+          <a:p>
+            <a:pPr lvl="1"/>
+            <a:r>
+              <a:rPr lang="en-US" dirty="0" smtClean="0"/>
+              <a:t>Review options</a:t>
+            </a:r>
+          </a:p>
+          <a:p>
+            <a:pPr lvl="1"/>
+            <a:r>
+              <a:rPr lang="en-US" dirty="0" smtClean="0"/>
+              <a:t>Task assignment </a:t>
+            </a:r>
+          </a:p>
+          <a:p>
+            <a:pPr lvl="1"/>
             <a:endParaRPr lang="en-US" dirty="0"/>
           </a:p>
         </p:txBody>
@@ -5758,7 +5815,7 @@
     </p:spTree>
     <p:extLst>
       <p:ext uri="{BB962C8B-B14F-4D97-AF65-F5344CB8AC3E}">
-        <p14:creationId xmlns:p14="http://schemas.microsoft.com/office/powerpoint/2010/main" val="6631764"/>
+        <p14:creationId xmlns:p14="http://schemas.microsoft.com/office/powerpoint/2010/main" val="4287590130"/>
       </p:ext>
     </p:extLst>
   </p:cSld>
@@ -5787,13 +5844,7 @@
       </p:grpSpPr>
       <p:sp>
         <p:nvSpPr>
-          <p:cNvPr id="2" name="Título 1">
-            <a:extLst>
-              <a:ext uri="{FF2B5EF4-FFF2-40B4-BE49-F238E27FC236}">
-                <a16:creationId xmlns:a16="http://schemas.microsoft.com/office/drawing/2014/main" id="{C64132B0-DA98-43DE-8084-0D3EA2A07A78}"/>
-              </a:ext>
-            </a:extLst>
-          </p:cNvPr>
+          <p:cNvPr id="2" name="Title 1"/>
           <p:cNvSpPr>
             <a:spLocks noGrp="1"/>
           </p:cNvSpPr>
@@ -5806,21 +5857,13 @@
           <a:bodyPr/>
           <a:lstStyle/>
           <a:p>
-            <a:r>
-              <a:rPr lang="en-US" dirty="0" smtClean="0"/>
-              <a:t>Version Control with </a:t>
-            </a:r>
-            <a:r>
-              <a:rPr lang="en-US" dirty="0" err="1" smtClean="0"/>
-              <a:t>Github</a:t>
-            </a:r>
-            <a:endParaRPr lang="en-US" dirty="0"/>
-          </a:p>
-        </p:txBody>
-      </p:sp>
-      <p:sp>
-        <p:nvSpPr>
-          <p:cNvPr id="5" name="Content Placeholder 4"/>
+            <a:endParaRPr lang="en-US"/>
+          </a:p>
+        </p:txBody>
+      </p:sp>
+      <p:sp>
+        <p:nvSpPr>
+          <p:cNvPr id="3" name="Content Placeholder 2"/>
           <p:cNvSpPr>
             <a:spLocks noGrp="1"/>
           </p:cNvSpPr>
@@ -5833,19 +5876,107 @@
           <a:bodyPr/>
           <a:lstStyle/>
           <a:p>
-            <a:endParaRPr lang="en-US"/>
-          </a:p>
-        </p:txBody>
-      </p:sp>
-      <p:sp>
-        <p:nvSpPr>
-          <p:cNvPr id="4" name="Marcador de número de diapositiva 3">
-            <a:extLst>
-              <a:ext uri="{FF2B5EF4-FFF2-40B4-BE49-F238E27FC236}">
-                <a16:creationId xmlns:a16="http://schemas.microsoft.com/office/drawing/2014/main" id="{8369396B-6E13-4FED-A6F2-DA8723B8CDEC}"/>
-              </a:ext>
-            </a:extLst>
-          </p:cNvPr>
+            <a:pPr marL="457200" indent="-457200">
+              <a:buFont typeface="+mj-lt"/>
+              <a:buAutoNum type="arabicPeriod"/>
+            </a:pPr>
+            <a:r>
+              <a:rPr lang="en-US" dirty="0" smtClean="0"/>
+              <a:t>Download </a:t>
+            </a:r>
+            <a:r>
+              <a:rPr lang="en-US" dirty="0" err="1" smtClean="0"/>
+              <a:t>Git</a:t>
+            </a:r>
+            <a:r>
+              <a:rPr lang="en-US" dirty="0" smtClean="0"/>
+              <a:t> </a:t>
+            </a:r>
+            <a:r>
+              <a:rPr lang="en-US" dirty="0" smtClean="0">
+                <a:hlinkClick r:id="rId2"/>
+              </a:rPr>
+              <a:t>Tutorial</a:t>
+            </a:r>
+            <a:endParaRPr lang="en-US" dirty="0" smtClean="0"/>
+          </a:p>
+          <a:p>
+            <a:pPr marL="457200" indent="-457200">
+              <a:buFont typeface="+mj-lt"/>
+              <a:buAutoNum type="arabicPeriod"/>
+            </a:pPr>
+            <a:r>
+              <a:rPr lang="en-US" dirty="0"/>
+              <a:t>The files you put on GitHub will be public (i.e. everyone can see them &amp; suggest changes, but only the people with access to the repository can directly edit </a:t>
+            </a:r>
+            <a:r>
+              <a:rPr lang="en-US" dirty="0" smtClean="0"/>
+              <a:t>and </a:t>
+            </a:r>
+            <a:r>
+              <a:rPr lang="en-US" dirty="0"/>
+              <a:t>add/remove files</a:t>
+            </a:r>
+            <a:r>
+              <a:rPr lang="en-US" dirty="0" smtClean="0"/>
+              <a:t>).</a:t>
+            </a:r>
+          </a:p>
+          <a:p>
+            <a:pPr marL="457200" indent="-457200">
+              <a:buFont typeface="+mj-lt"/>
+              <a:buAutoNum type="arabicPeriod"/>
+            </a:pPr>
+            <a:r>
+              <a:rPr lang="en-US" dirty="0" smtClean="0"/>
+              <a:t>Repository: Master Folder</a:t>
+            </a:r>
+          </a:p>
+          <a:p>
+            <a:pPr marL="457200" indent="-457200">
+              <a:buFont typeface="+mj-lt"/>
+              <a:buAutoNum type="arabicPeriod"/>
+            </a:pPr>
+            <a:r>
+              <a:rPr lang="en-US" dirty="0" smtClean="0"/>
+              <a:t>Workflow: commit-pull-push</a:t>
+            </a:r>
+          </a:p>
+          <a:p>
+            <a:pPr marL="857250" lvl="1" indent="-457200">
+              <a:buFont typeface="+mj-lt"/>
+              <a:buAutoNum type="arabicPeriod"/>
+            </a:pPr>
+            <a:r>
+              <a:rPr lang="en-US" dirty="0" smtClean="0"/>
+              <a:t>Commit: Update changes in online repo.</a:t>
+            </a:r>
+          </a:p>
+          <a:p>
+            <a:pPr marL="857250" lvl="1" indent="-457200">
+              <a:buFont typeface="+mj-lt"/>
+              <a:buAutoNum type="arabicPeriod"/>
+            </a:pPr>
+            <a:r>
+              <a:rPr lang="en-US" dirty="0" smtClean="0"/>
+              <a:t>Pull: Before saving changes, we must ‘pull’ the latest version from the repo. </a:t>
+            </a:r>
+          </a:p>
+          <a:p>
+            <a:pPr marL="857250" lvl="1" indent="-457200">
+              <a:buFont typeface="+mj-lt"/>
+              <a:buAutoNum type="arabicPeriod"/>
+            </a:pPr>
+            <a:r>
+              <a:rPr lang="en-US" dirty="0" smtClean="0"/>
+              <a:t>Push: push changes so local and online copy are the same. </a:t>
+            </a:r>
+          </a:p>
+        </p:txBody>
+      </p:sp>
+      <p:sp>
+        <p:nvSpPr>
+          <p:cNvPr id="4" name="Slide Number Placeholder 3"/>
           <p:cNvSpPr>
             <a:spLocks noGrp="1"/>
           </p:cNvSpPr>
@@ -5870,7 +6001,99 @@
     </p:spTree>
     <p:extLst>
       <p:ext uri="{BB962C8B-B14F-4D97-AF65-F5344CB8AC3E}">
-        <p14:creationId xmlns:p14="http://schemas.microsoft.com/office/powerpoint/2010/main" val="4287590130"/>
+        <p14:creationId xmlns:p14="http://schemas.microsoft.com/office/powerpoint/2010/main" val="2800188222"/>
+      </p:ext>
+    </p:extLst>
+  </p:cSld>
+  <p:clrMapOvr>
+    <a:masterClrMapping/>
+  </p:clrMapOvr>
+</p:sld>
+</file>
+
+<file path=ppt/slides/slide6.xml><?xml version="1.0" encoding="utf-8"?>
+<p:sld xmlns:a="http://schemas.openxmlformats.org/drawingml/2006/main" xmlns:r="http://schemas.openxmlformats.org/officeDocument/2006/relationships" xmlns:p="http://schemas.openxmlformats.org/presentationml/2006/main">
+  <p:cSld>
+    <p:spTree>
+      <p:nvGrpSpPr>
+        <p:cNvPr id="1" name=""/>
+        <p:cNvGrpSpPr/>
+        <p:nvPr/>
+      </p:nvGrpSpPr>
+      <p:grpSpPr>
+        <a:xfrm>
+          <a:off x="0" y="0"/>
+          <a:ext cx="0" cy="0"/>
+          <a:chOff x="0" y="0"/>
+          <a:chExt cx="0" cy="0"/>
+        </a:xfrm>
+      </p:grpSpPr>
+      <p:sp>
+        <p:nvSpPr>
+          <p:cNvPr id="2" name="Title 1"/>
+          <p:cNvSpPr>
+            <a:spLocks noGrp="1"/>
+          </p:cNvSpPr>
+          <p:nvPr>
+            <p:ph type="title"/>
+          </p:nvPr>
+        </p:nvSpPr>
+        <p:spPr/>
+        <p:txBody>
+          <a:bodyPr/>
+          <a:lstStyle/>
+          <a:p>
+            <a:endParaRPr lang="en-US"/>
+          </a:p>
+        </p:txBody>
+      </p:sp>
+      <p:sp>
+        <p:nvSpPr>
+          <p:cNvPr id="3" name="Content Placeholder 2"/>
+          <p:cNvSpPr>
+            <a:spLocks noGrp="1"/>
+          </p:cNvSpPr>
+          <p:nvPr>
+            <p:ph idx="1"/>
+          </p:nvPr>
+        </p:nvSpPr>
+        <p:spPr/>
+        <p:txBody>
+          <a:bodyPr/>
+          <a:lstStyle/>
+          <a:p>
+            <a:endParaRPr lang="en-US"/>
+          </a:p>
+        </p:txBody>
+      </p:sp>
+      <p:sp>
+        <p:nvSpPr>
+          <p:cNvPr id="4" name="Slide Number Placeholder 3"/>
+          <p:cNvSpPr>
+            <a:spLocks noGrp="1"/>
+          </p:cNvSpPr>
+          <p:nvPr>
+            <p:ph type="sldNum" sz="quarter" idx="11"/>
+          </p:nvPr>
+        </p:nvSpPr>
+        <p:spPr/>
+        <p:txBody>
+          <a:bodyPr/>
+          <a:lstStyle/>
+          <a:p>
+            <a:fld id="{B347FA65-0AFF-D745-B01A-93117137B35D}" type="slidenum">
+              <a:rPr lang="en-US" smtClean="0"/>
+              <a:pPr/>
+              <a:t>6</a:t>
+            </a:fld>
+            <a:endParaRPr lang="en-US" dirty="0"/>
+          </a:p>
+        </p:txBody>
+      </p:sp>
+    </p:spTree>
+    <p:extLst>
+      <p:ext uri="{BB962C8B-B14F-4D97-AF65-F5344CB8AC3E}">
+        <p14:creationId xmlns:p14="http://schemas.microsoft.com/office/powerpoint/2010/main" val="2931938938"/>
       </p:ext>
     </p:extLst>
   </p:cSld>

</xml_diff>